<commit_message>
upload of final notebook for the first assignment part one
</commit_message>
<xml_diff>
--- a/graph_model.pptx
+++ b/graph_model.pptx
@@ -372,7 +372,7 @@
           <a:p>
             <a:fld id="{B53E5D0F-0456-4AFA-B30A-E9260CD0E076}" type="datetimeFigureOut">
               <a:rPr lang="en-US" smtClean="0"/>
-              <a:t>2/12/2023</a:t>
+              <a:t>2/13/2023</a:t>
             </a:fld>
             <a:endParaRPr lang="en-US"/>
           </a:p>
@@ -570,7 +570,7 @@
           <a:p>
             <a:fld id="{B53E5D0F-0456-4AFA-B30A-E9260CD0E076}" type="datetimeFigureOut">
               <a:rPr lang="en-US" smtClean="0"/>
-              <a:t>2/12/2023</a:t>
+              <a:t>2/13/2023</a:t>
             </a:fld>
             <a:endParaRPr lang="en-US"/>
           </a:p>
@@ -778,7 +778,7 @@
           <a:p>
             <a:fld id="{B53E5D0F-0456-4AFA-B30A-E9260CD0E076}" type="datetimeFigureOut">
               <a:rPr lang="en-US" smtClean="0"/>
-              <a:t>2/12/2023</a:t>
+              <a:t>2/13/2023</a:t>
             </a:fld>
             <a:endParaRPr lang="en-US"/>
           </a:p>
@@ -976,7 +976,7 @@
           <a:p>
             <a:fld id="{B53E5D0F-0456-4AFA-B30A-E9260CD0E076}" type="datetimeFigureOut">
               <a:rPr lang="en-US" smtClean="0"/>
-              <a:t>2/12/2023</a:t>
+              <a:t>2/13/2023</a:t>
             </a:fld>
             <a:endParaRPr lang="en-US"/>
           </a:p>
@@ -1251,7 +1251,7 @@
           <a:p>
             <a:fld id="{B53E5D0F-0456-4AFA-B30A-E9260CD0E076}" type="datetimeFigureOut">
               <a:rPr lang="en-US" smtClean="0"/>
-              <a:t>2/12/2023</a:t>
+              <a:t>2/13/2023</a:t>
             </a:fld>
             <a:endParaRPr lang="en-US"/>
           </a:p>
@@ -1516,7 +1516,7 @@
           <a:p>
             <a:fld id="{B53E5D0F-0456-4AFA-B30A-E9260CD0E076}" type="datetimeFigureOut">
               <a:rPr lang="en-US" smtClean="0"/>
-              <a:t>2/12/2023</a:t>
+              <a:t>2/13/2023</a:t>
             </a:fld>
             <a:endParaRPr lang="en-US"/>
           </a:p>
@@ -1928,7 +1928,7 @@
           <a:p>
             <a:fld id="{B53E5D0F-0456-4AFA-B30A-E9260CD0E076}" type="datetimeFigureOut">
               <a:rPr lang="en-US" smtClean="0"/>
-              <a:t>2/12/2023</a:t>
+              <a:t>2/13/2023</a:t>
             </a:fld>
             <a:endParaRPr lang="en-US"/>
           </a:p>
@@ -2069,7 +2069,7 @@
           <a:p>
             <a:fld id="{B53E5D0F-0456-4AFA-B30A-E9260CD0E076}" type="datetimeFigureOut">
               <a:rPr lang="en-US" smtClean="0"/>
-              <a:t>2/12/2023</a:t>
+              <a:t>2/13/2023</a:t>
             </a:fld>
             <a:endParaRPr lang="en-US"/>
           </a:p>
@@ -2182,7 +2182,7 @@
           <a:p>
             <a:fld id="{B53E5D0F-0456-4AFA-B30A-E9260CD0E076}" type="datetimeFigureOut">
               <a:rPr lang="en-US" smtClean="0"/>
-              <a:t>2/12/2023</a:t>
+              <a:t>2/13/2023</a:t>
             </a:fld>
             <a:endParaRPr lang="en-US"/>
           </a:p>
@@ -2493,7 +2493,7 @@
           <a:p>
             <a:fld id="{B53E5D0F-0456-4AFA-B30A-E9260CD0E076}" type="datetimeFigureOut">
               <a:rPr lang="en-US" smtClean="0"/>
-              <a:t>2/12/2023</a:t>
+              <a:t>2/13/2023</a:t>
             </a:fld>
             <a:endParaRPr lang="en-US"/>
           </a:p>
@@ -2781,7 +2781,7 @@
           <a:p>
             <a:fld id="{B53E5D0F-0456-4AFA-B30A-E9260CD0E076}" type="datetimeFigureOut">
               <a:rPr lang="en-US" smtClean="0"/>
-              <a:t>2/12/2023</a:t>
+              <a:t>2/13/2023</a:t>
             </a:fld>
             <a:endParaRPr lang="en-US"/>
           </a:p>
@@ -3022,7 +3022,7 @@
           <a:p>
             <a:fld id="{B53E5D0F-0456-4AFA-B30A-E9260CD0E076}" type="datetimeFigureOut">
               <a:rPr lang="en-US" smtClean="0"/>
-              <a:t>2/12/2023</a:t>
+              <a:t>2/13/2023</a:t>
             </a:fld>
             <a:endParaRPr lang="en-US"/>
           </a:p>

</xml_diff>